<commit_message>
Dodane slike i literatura u prezentaciju
</commit_message>
<xml_diff>
--- a/Prezentacija.pptx
+++ b/Prezentacija.pptx
@@ -9,11 +9,14 @@
     <p:sldId id="257" r:id="rId3"/>
     <p:sldId id="258" r:id="rId4"/>
     <p:sldId id="262" r:id="rId5"/>
-    <p:sldId id="263" r:id="rId6"/>
-    <p:sldId id="264" r:id="rId7"/>
-    <p:sldId id="265" r:id="rId8"/>
-    <p:sldId id="259" r:id="rId9"/>
-    <p:sldId id="260" r:id="rId10"/>
+    <p:sldId id="267" r:id="rId6"/>
+    <p:sldId id="263" r:id="rId7"/>
+    <p:sldId id="264" r:id="rId8"/>
+    <p:sldId id="268" r:id="rId9"/>
+    <p:sldId id="265" r:id="rId10"/>
+    <p:sldId id="259" r:id="rId11"/>
+    <p:sldId id="260" r:id="rId12"/>
+    <p:sldId id="266" r:id="rId13"/>
   </p:sldIdLst>
   <p:sldSz cx="12192000" cy="6858000"/>
   <p:notesSz cx="6858000" cy="9144000"/>
@@ -112,6 +115,11 @@
       </a:defRPr>
     </a:lvl9pPr>
   </p:defaultTextStyle>
+  <p:extLst>
+    <p:ext uri="{EFAFB233-063F-42B5-8137-9DF3F51BA10A}">
+      <p15:sldGuideLst xmlns:p15="http://schemas.microsoft.com/office/powerpoint/2012/main"/>
+    </p:ext>
+  </p:extLst>
 </p:presentation>
 </file>
 
@@ -5917,6 +5925,403 @@
 </p:sld>
 </file>
 
+<file path=ppt/slides/slide10.xml><?xml version="1.0" encoding="utf-8"?>
+<p:sld xmlns:a="http://schemas.openxmlformats.org/drawingml/2006/main" xmlns:r="http://schemas.openxmlformats.org/officeDocument/2006/relationships" xmlns:p="http://schemas.openxmlformats.org/presentationml/2006/main">
+  <p:cSld>
+    <p:spTree>
+      <p:nvGrpSpPr>
+        <p:cNvPr id="1" name=""/>
+        <p:cNvGrpSpPr/>
+        <p:nvPr/>
+      </p:nvGrpSpPr>
+      <p:grpSpPr>
+        <a:xfrm>
+          <a:off x="0" y="0"/>
+          <a:ext cx="0" cy="0"/>
+          <a:chOff x="0" y="0"/>
+          <a:chExt cx="0" cy="0"/>
+        </a:xfrm>
+      </p:grpSpPr>
+      <p:sp>
+        <p:nvSpPr>
+          <p:cNvPr id="2" name="Title 1">
+            <a:extLst>
+              <a:ext uri="{FF2B5EF4-FFF2-40B4-BE49-F238E27FC236}">
+                <a16:creationId xmlns:a16="http://schemas.microsoft.com/office/drawing/2014/main" id="{EFCF06C0-1A9A-491D-B8C0-BA2C2F58781E}"/>
+              </a:ext>
+            </a:extLst>
+          </p:cNvPr>
+          <p:cNvSpPr>
+            <a:spLocks noGrp="1"/>
+          </p:cNvSpPr>
+          <p:nvPr>
+            <p:ph type="title"/>
+          </p:nvPr>
+        </p:nvSpPr>
+        <p:spPr/>
+        <p:txBody>
+          <a:bodyPr/>
+          <a:lstStyle/>
+          <a:p>
+            <a:r>
+              <a:rPr lang="hr-HR" b="1" dirty="0"/>
+              <a:t>Rezultati</a:t>
+            </a:r>
+          </a:p>
+        </p:txBody>
+      </p:sp>
+      <p:sp>
+        <p:nvSpPr>
+          <p:cNvPr id="3" name="Content Placeholder 2">
+            <a:extLst>
+              <a:ext uri="{FF2B5EF4-FFF2-40B4-BE49-F238E27FC236}">
+                <a16:creationId xmlns:a16="http://schemas.microsoft.com/office/drawing/2014/main" id="{67D9A839-D24D-4297-ABB3-9D4BE693B744}"/>
+              </a:ext>
+            </a:extLst>
+          </p:cNvPr>
+          <p:cNvSpPr>
+            <a:spLocks noGrp="1"/>
+          </p:cNvSpPr>
+          <p:nvPr>
+            <p:ph idx="1"/>
+          </p:nvPr>
+        </p:nvSpPr>
+        <p:spPr/>
+        <p:txBody>
+          <a:bodyPr>
+            <a:normAutofit fontScale="92500"/>
+          </a:bodyPr>
+          <a:lstStyle/>
+          <a:p>
+            <a:r>
+              <a:rPr lang="hr-HR" sz="2400" dirty="0"/>
+              <a:t>Usporedba dobivenih mutacija s referentnom implementacijom</a:t>
+            </a:r>
+          </a:p>
+          <a:p>
+            <a:r>
+              <a:rPr lang="hr-HR" sz="2400" dirty="0"/>
+              <a:t>Jaccardov indeks</a:t>
+            </a:r>
+          </a:p>
+          <a:p>
+            <a:r>
+              <a:rPr lang="hr-HR" sz="2400" dirty="0"/>
+              <a:t>Na genomu lambde 0.72972972973, na e.coli 0.84767500855 </a:t>
+            </a:r>
+          </a:p>
+          <a:p>
+            <a:r>
+              <a:rPr lang="hr-HR" sz="2400" dirty="0"/>
+              <a:t>Vrijeme izvođenja na lambdi ~3 minute, dok na e.coli ~5 sati, paralelizirano na 8 dretvi</a:t>
+            </a:r>
+          </a:p>
+          <a:p>
+            <a:r>
+              <a:rPr lang="hr-HR" sz="2400" dirty="0"/>
+              <a:t>Zauzeće memorije ~13MB na genomu lambde te ~800MB na genomu e.coli</a:t>
+            </a:r>
+          </a:p>
+          <a:p>
+            <a:pPr marL="0" indent="0">
+              <a:buNone/>
+            </a:pPr>
+            <a:br>
+              <a:rPr lang="hr-HR" dirty="0"/>
+            </a:br>
+            <a:endParaRPr lang="hr-HR" dirty="0"/>
+          </a:p>
+        </p:txBody>
+      </p:sp>
+    </p:spTree>
+    <p:extLst>
+      <p:ext uri="{BB962C8B-B14F-4D97-AF65-F5344CB8AC3E}">
+        <p14:creationId xmlns:p14="http://schemas.microsoft.com/office/powerpoint/2010/main" val="3640518966"/>
+      </p:ext>
+    </p:extLst>
+  </p:cSld>
+  <p:clrMapOvr>
+    <a:masterClrMapping/>
+  </p:clrMapOvr>
+</p:sld>
+</file>
+
+<file path=ppt/slides/slide11.xml><?xml version="1.0" encoding="utf-8"?>
+<p:sld xmlns:a="http://schemas.openxmlformats.org/drawingml/2006/main" xmlns:r="http://schemas.openxmlformats.org/officeDocument/2006/relationships" xmlns:p="http://schemas.openxmlformats.org/presentationml/2006/main">
+  <p:cSld>
+    <p:spTree>
+      <p:nvGrpSpPr>
+        <p:cNvPr id="1" name=""/>
+        <p:cNvGrpSpPr/>
+        <p:nvPr/>
+      </p:nvGrpSpPr>
+      <p:grpSpPr>
+        <a:xfrm>
+          <a:off x="0" y="0"/>
+          <a:ext cx="0" cy="0"/>
+          <a:chOff x="0" y="0"/>
+          <a:chExt cx="0" cy="0"/>
+        </a:xfrm>
+      </p:grpSpPr>
+      <p:sp>
+        <p:nvSpPr>
+          <p:cNvPr id="2" name="Title 1">
+            <a:extLst>
+              <a:ext uri="{FF2B5EF4-FFF2-40B4-BE49-F238E27FC236}">
+                <a16:creationId xmlns:a16="http://schemas.microsoft.com/office/drawing/2014/main" id="{F4F3404E-375B-4E4F-B224-D425DAEBBF57}"/>
+              </a:ext>
+            </a:extLst>
+          </p:cNvPr>
+          <p:cNvSpPr>
+            <a:spLocks noGrp="1"/>
+          </p:cNvSpPr>
+          <p:nvPr>
+            <p:ph type="title"/>
+          </p:nvPr>
+        </p:nvSpPr>
+        <p:spPr/>
+        <p:txBody>
+          <a:bodyPr/>
+          <a:lstStyle/>
+          <a:p>
+            <a:r>
+              <a:rPr lang="hr-HR" b="1" dirty="0"/>
+              <a:t>Zaključak</a:t>
+            </a:r>
+          </a:p>
+        </p:txBody>
+      </p:sp>
+      <p:sp>
+        <p:nvSpPr>
+          <p:cNvPr id="3" name="Content Placeholder 2">
+            <a:extLst>
+              <a:ext uri="{FF2B5EF4-FFF2-40B4-BE49-F238E27FC236}">
+                <a16:creationId xmlns:a16="http://schemas.microsoft.com/office/drawing/2014/main" id="{F9D5FFFA-261D-40C8-ABB3-980AFE8FFDD1}"/>
+              </a:ext>
+            </a:extLst>
+          </p:cNvPr>
+          <p:cNvSpPr>
+            <a:spLocks noGrp="1"/>
+          </p:cNvSpPr>
+          <p:nvPr>
+            <p:ph idx="1"/>
+          </p:nvPr>
+        </p:nvSpPr>
+        <p:spPr/>
+        <p:txBody>
+          <a:bodyPr>
+            <a:normAutofit/>
+          </a:bodyPr>
+          <a:lstStyle/>
+          <a:p>
+            <a:r>
+              <a:rPr lang="hr-HR" sz="2400" dirty="0"/>
+              <a:t>Korišteni algoritmi daju dobre rezultate i kod sekvenciranja s vrlo visokom pogreškom</a:t>
+            </a:r>
+          </a:p>
+          <a:p>
+            <a:r>
+              <a:rPr lang="hr-HR" sz="2400" dirty="0"/>
+              <a:t>Vrlo visoka točnost te vrlo niska memorijska složenost</a:t>
+            </a:r>
+          </a:p>
+          <a:p>
+            <a:r>
+              <a:rPr lang="hr-HR" sz="2400" dirty="0"/>
+              <a:t>Problem je vremenska složenost</a:t>
+            </a:r>
+          </a:p>
+        </p:txBody>
+      </p:sp>
+    </p:spTree>
+    <p:extLst>
+      <p:ext uri="{BB962C8B-B14F-4D97-AF65-F5344CB8AC3E}">
+        <p14:creationId xmlns:p14="http://schemas.microsoft.com/office/powerpoint/2010/main" val="1923492173"/>
+      </p:ext>
+    </p:extLst>
+  </p:cSld>
+  <p:clrMapOvr>
+    <a:masterClrMapping/>
+  </p:clrMapOvr>
+</p:sld>
+</file>
+
+<file path=ppt/slides/slide12.xml><?xml version="1.0" encoding="utf-8"?>
+<p:sld xmlns:a="http://schemas.openxmlformats.org/drawingml/2006/main" xmlns:r="http://schemas.openxmlformats.org/officeDocument/2006/relationships" xmlns:p="http://schemas.openxmlformats.org/presentationml/2006/main">
+  <p:cSld>
+    <p:spTree>
+      <p:nvGrpSpPr>
+        <p:cNvPr id="1" name=""/>
+        <p:cNvGrpSpPr/>
+        <p:nvPr/>
+      </p:nvGrpSpPr>
+      <p:grpSpPr>
+        <a:xfrm>
+          <a:off x="0" y="0"/>
+          <a:ext cx="0" cy="0"/>
+          <a:chOff x="0" y="0"/>
+          <a:chExt cx="0" cy="0"/>
+        </a:xfrm>
+      </p:grpSpPr>
+      <p:sp>
+        <p:nvSpPr>
+          <p:cNvPr id="2" name="Title 1">
+            <a:extLst>
+              <a:ext uri="{FF2B5EF4-FFF2-40B4-BE49-F238E27FC236}">
+                <a16:creationId xmlns:a16="http://schemas.microsoft.com/office/drawing/2014/main" id="{858C6270-275E-4317-8F59-CAC68CF9FD14}"/>
+              </a:ext>
+            </a:extLst>
+          </p:cNvPr>
+          <p:cNvSpPr>
+            <a:spLocks noGrp="1"/>
+          </p:cNvSpPr>
+          <p:nvPr>
+            <p:ph type="title"/>
+          </p:nvPr>
+        </p:nvSpPr>
+        <p:spPr/>
+        <p:txBody>
+          <a:bodyPr/>
+          <a:lstStyle/>
+          <a:p>
+            <a:r>
+              <a:rPr lang="hr-HR" dirty="0"/>
+              <a:t>Literatura</a:t>
+            </a:r>
+          </a:p>
+        </p:txBody>
+      </p:sp>
+      <p:sp>
+        <p:nvSpPr>
+          <p:cNvPr id="3" name="Content Placeholder 2">
+            <a:extLst>
+              <a:ext uri="{FF2B5EF4-FFF2-40B4-BE49-F238E27FC236}">
+                <a16:creationId xmlns:a16="http://schemas.microsoft.com/office/drawing/2014/main" id="{55C67357-8696-489C-8C31-40E067D8E916}"/>
+              </a:ext>
+            </a:extLst>
+          </p:cNvPr>
+          <p:cNvSpPr>
+            <a:spLocks noGrp="1"/>
+          </p:cNvSpPr>
+          <p:nvPr>
+            <p:ph idx="1"/>
+          </p:nvPr>
+        </p:nvSpPr>
+        <p:spPr/>
+        <p:txBody>
+          <a:bodyPr>
+            <a:normAutofit fontScale="92500"/>
+          </a:bodyPr>
+          <a:lstStyle/>
+          <a:p>
+            <a:r>
+              <a:rPr lang="hr-HR" dirty="0"/>
+              <a:t>[1] Michael Roberts, Wayne Hayes, Brian R. Hunt, Stephen M. Mount, James A.</a:t>
+            </a:r>
+            <a:br>
+              <a:rPr lang="hr-HR" dirty="0"/>
+            </a:br>
+            <a:r>
+              <a:rPr lang="hr-HR" dirty="0"/>
+              <a:t>Yorke. Reducing storage requirements for biological sequence comparison, 15</a:t>
+            </a:r>
+            <a:br>
+              <a:rPr lang="hr-HR" dirty="0"/>
+            </a:br>
+            <a:r>
+              <a:rPr lang="hr-HR" dirty="0"/>
+              <a:t>Srpanj 2004.</a:t>
+            </a:r>
+            <a:br>
+              <a:rPr lang="hr-HR" dirty="0"/>
+            </a:br>
+            <a:r>
+              <a:rPr lang="hr-HR" dirty="0"/>
+              <a:t>[2] Heng Li. Minimap and miniasm: fast mapping and de novo assembly for noisy</a:t>
+            </a:r>
+            <a:br>
+              <a:rPr lang="hr-HR" dirty="0"/>
+            </a:br>
+            <a:r>
+              <a:rPr lang="hr-HR" dirty="0"/>
+              <a:t>long sequences, 19 Ožujak 2016.</a:t>
+            </a:r>
+            <a:br>
+              <a:rPr lang="hr-HR" dirty="0"/>
+            </a:br>
+            <a:r>
+              <a:rPr lang="hr-HR" dirty="0"/>
+              <a:t>[3] Mile Šikić, Mirjana Domazet-Lošo. Skripta za predmet Bioinformatika, Prosinac</a:t>
+            </a:r>
+            <a:br>
+              <a:rPr lang="hr-HR" dirty="0"/>
+            </a:br>
+            <a:r>
+              <a:rPr lang="hr-HR" dirty="0"/>
+              <a:t>2013.</a:t>
+            </a:r>
+            <a:br>
+              <a:rPr lang="hr-HR" dirty="0"/>
+            </a:br>
+            <a:r>
+              <a:rPr lang="hr-HR" dirty="0"/>
+              <a:t>[4] Dan Hirschberg. A linear space algorithm for computing maximal common</a:t>
+            </a:r>
+            <a:br>
+              <a:rPr lang="hr-HR" dirty="0"/>
+            </a:br>
+            <a:r>
+              <a:rPr lang="hr-HR" dirty="0"/>
+              <a:t>subsequences, 1975.</a:t>
+            </a:r>
+            <a:br>
+              <a:rPr lang="hr-HR" dirty="0"/>
+            </a:br>
+            <a:r>
+              <a:rPr lang="hr-HR" dirty="0"/>
+              <a:t>[5] Jaccard Index / Similarity Coefficient, December 2, 2016.</a:t>
+            </a:r>
+            <a:br>
+              <a:rPr lang="hr-HR" dirty="0"/>
+            </a:br>
+            <a:r>
+              <a:rPr lang="hr-HR" dirty="0"/>
+              <a:t>https://www.statisticshowto.datasciencecentral.com/jaccard-index/.</a:t>
+            </a:r>
+            <a:br>
+              <a:rPr lang="hr-HR" dirty="0"/>
+            </a:br>
+            <a:r>
+              <a:rPr lang="hr-HR" dirty="0"/>
+              <a:t>[6] Longest increasing subsequence, July 29, 2018.</a:t>
+            </a:r>
+            <a:br>
+              <a:rPr lang="hr-HR" dirty="0"/>
+            </a:br>
+            <a:r>
+              <a:rPr lang="hr-HR" dirty="0"/>
+              <a:t>https://en.wikipedia.org/wiki/Longest_increasing_subsequence </a:t>
+            </a:r>
+            <a:br>
+              <a:rPr lang="hr-HR" dirty="0"/>
+            </a:br>
+            <a:endParaRPr lang="hr-HR" dirty="0"/>
+          </a:p>
+        </p:txBody>
+      </p:sp>
+    </p:spTree>
+    <p:extLst>
+      <p:ext uri="{BB962C8B-B14F-4D97-AF65-F5344CB8AC3E}">
+        <p14:creationId xmlns:p14="http://schemas.microsoft.com/office/powerpoint/2010/main" val="2820213608"/>
+      </p:ext>
+    </p:extLst>
+  </p:cSld>
+  <p:clrMapOvr>
+    <a:masterClrMapping/>
+  </p:clrMapOvr>
+</p:sld>
+</file>
+
 <file path=ppt/slides/slide2.xml><?xml version="1.0" encoding="utf-8"?>
 <p:sld xmlns:a="http://schemas.openxmlformats.org/drawingml/2006/main" xmlns:r="http://schemas.openxmlformats.org/officeDocument/2006/relationships" xmlns:p="http://schemas.openxmlformats.org/presentationml/2006/main">
   <p:cSld>
@@ -6275,7 +6680,7 @@
           <p:cNvPr id="2" name="Title 1">
             <a:extLst>
               <a:ext uri="{FF2B5EF4-FFF2-40B4-BE49-F238E27FC236}">
-                <a16:creationId xmlns:a16="http://schemas.microsoft.com/office/drawing/2014/main" id="{32EAB563-B102-4A85-9312-70A79AFB68B5}"/>
+                <a16:creationId xmlns:a16="http://schemas.microsoft.com/office/drawing/2014/main" id="{43E4FF63-ACBC-4395-917D-8979ACE37845}"/>
               </a:ext>
             </a:extLst>
           </p:cNvPr>
@@ -6293,17 +6698,17 @@
           <a:p>
             <a:r>
               <a:rPr lang="hr-HR" dirty="0"/>
-              <a:t>Najdulja rastuća sekvenca</a:t>
-            </a:r>
-          </a:p>
-        </p:txBody>
-      </p:sp>
-      <p:sp>
-        <p:nvSpPr>
-          <p:cNvPr id="3" name="Content Placeholder 2">
+              <a:t>K-meri i minimizatori</a:t>
+            </a:r>
+          </a:p>
+        </p:txBody>
+      </p:sp>
+      <p:sp>
+        <p:nvSpPr>
+          <p:cNvPr id="5" name="Text Placeholder 4">
             <a:extLst>
               <a:ext uri="{FF2B5EF4-FFF2-40B4-BE49-F238E27FC236}">
-                <a16:creationId xmlns:a16="http://schemas.microsoft.com/office/drawing/2014/main" id="{1EAB5CF4-4B08-4C4F-966F-D73CF59019B3}"/>
+                <a16:creationId xmlns:a16="http://schemas.microsoft.com/office/drawing/2014/main" id="{A2C05D48-0711-47D1-945D-A9FB29C61CDB}"/>
               </a:ext>
             </a:extLst>
           </p:cNvPr>
@@ -6311,45 +6716,61 @@
             <a:spLocks noGrp="1"/>
           </p:cNvSpPr>
           <p:nvPr>
-            <p:ph idx="1"/>
+            <p:ph type="body" sz="half" idx="2"/>
           </p:nvPr>
         </p:nvSpPr>
         <p:spPr/>
         <p:txBody>
-          <a:bodyPr>
-            <a:normAutofit/>
-          </a:bodyPr>
-          <a:lstStyle/>
-          <a:p>
-            <a:r>
-              <a:rPr lang="hr-HR" sz="2400" dirty="0"/>
-              <a:t>Pronalazak indeksa podudaranja minimizera referentnog genoma i očitanja</a:t>
-            </a:r>
-          </a:p>
-          <a:p>
-            <a:r>
-              <a:rPr lang="hr-HR" sz="2400" dirty="0"/>
-              <a:t>Potrebno naći najdulju rastuću sekvencu relativno bliskih indeksa podudaranja</a:t>
-            </a:r>
-          </a:p>
-          <a:p>
-            <a:r>
-              <a:rPr lang="hr-HR" sz="2400" dirty="0"/>
-              <a:t>Najvjerojatnije mapirano područje</a:t>
-            </a:r>
-          </a:p>
-          <a:p>
-            <a:r>
-              <a:rPr lang="hr-HR" sz="2400" dirty="0"/>
-              <a:t>Zapamtiti indekse početka i kraja mapiranog područja referentnog genoma i mutiranog očitanja</a:t>
-            </a:r>
-          </a:p>
-        </p:txBody>
-      </p:sp>
+          <a:bodyPr/>
+          <a:lstStyle/>
+          <a:p>
+            <a:r>
+              <a:rPr lang="hr-HR" dirty="0"/>
+              <a:t>Slika prikazuje odabiranje minimizatora od svih k-mera u dva prozora. (a) Odabiranje (5, 3)-minimizatora od 5 susjednih 3-mera. (b) Odabiranje (6, 7)-minimizatora od 6 susjednih 7-mera. Slika je preuzeta iz rada [1].</a:t>
+            </a:r>
+          </a:p>
+        </p:txBody>
+      </p:sp>
+      <p:pic>
+        <p:nvPicPr>
+          <p:cNvPr id="15" name="Picture 14">
+            <a:extLst>
+              <a:ext uri="{FF2B5EF4-FFF2-40B4-BE49-F238E27FC236}">
+                <a16:creationId xmlns:a16="http://schemas.microsoft.com/office/drawing/2014/main" id="{392112A6-ABED-44E6-AFD6-4A7321BA9AB0}"/>
+              </a:ext>
+            </a:extLst>
+          </p:cNvPr>
+          <p:cNvPicPr>
+            <a:picLocks noChangeAspect="1"/>
+          </p:cNvPicPr>
+          <p:nvPr/>
+        </p:nvPicPr>
+        <p:blipFill>
+          <a:blip r:embed="rId2">
+            <a:extLst>
+              <a:ext uri="{28A0092B-C50C-407E-A947-70E740481C1C}">
+                <a14:useLocalDpi xmlns:a14="http://schemas.microsoft.com/office/drawing/2010/main" val="0"/>
+              </a:ext>
+            </a:extLst>
+          </a:blip>
+          <a:stretch>
+            <a:fillRect/>
+          </a:stretch>
+        </p:blipFill>
+        <p:spPr>
+          <a:xfrm>
+            <a:off x="1289559" y="1088231"/>
+            <a:ext cx="7372215" cy="2783378"/>
+          </a:xfrm>
+          <a:prstGeom prst="rect">
+            <a:avLst/>
+          </a:prstGeom>
+        </p:spPr>
+      </p:pic>
     </p:spTree>
     <p:extLst>
       <p:ext uri="{BB962C8B-B14F-4D97-AF65-F5344CB8AC3E}">
-        <p14:creationId xmlns:p14="http://schemas.microsoft.com/office/powerpoint/2010/main" val="740710202"/>
+        <p14:creationId xmlns:p14="http://schemas.microsoft.com/office/powerpoint/2010/main" val="1598379748"/>
       </p:ext>
     </p:extLst>
   </p:cSld>
@@ -6381,7 +6802,7 @@
           <p:cNvPr id="2" name="Title 1">
             <a:extLst>
               <a:ext uri="{FF2B5EF4-FFF2-40B4-BE49-F238E27FC236}">
-                <a16:creationId xmlns:a16="http://schemas.microsoft.com/office/drawing/2014/main" id="{ECE6CF85-B450-403A-9FD3-53CD6A13650E}"/>
+                <a16:creationId xmlns:a16="http://schemas.microsoft.com/office/drawing/2014/main" id="{32EAB563-B102-4A85-9312-70A79AFB68B5}"/>
               </a:ext>
             </a:extLst>
           </p:cNvPr>
@@ -6399,7 +6820,7 @@
           <a:p>
             <a:r>
               <a:rPr lang="hr-HR" dirty="0"/>
-              <a:t>Hirschbergov algoritam</a:t>
+              <a:t>Najdulja rastuća sekvenca</a:t>
             </a:r>
           </a:p>
         </p:txBody>
@@ -6409,7 +6830,7 @@
           <p:cNvPr id="3" name="Content Placeholder 2">
             <a:extLst>
               <a:ext uri="{FF2B5EF4-FFF2-40B4-BE49-F238E27FC236}">
-                <a16:creationId xmlns:a16="http://schemas.microsoft.com/office/drawing/2014/main" id="{EBC233EA-1E14-4E59-9B02-96FF2FC08E8C}"/>
+                <a16:creationId xmlns:a16="http://schemas.microsoft.com/office/drawing/2014/main" id="{1EAB5CF4-4B08-4C4F-966F-D73CF59019B3}"/>
               </a:ext>
             </a:extLst>
           </p:cNvPr>
@@ -6429,31 +6850,25 @@
           <a:p>
             <a:r>
               <a:rPr lang="hr-HR" sz="2400" dirty="0"/>
-              <a:t>Dinamički algoritam za nalaženje optimalnog poravnanja</a:t>
+              <a:t>Pronalazak indeksa podudaranja minimizera referentnog genoma i očitanja</a:t>
             </a:r>
           </a:p>
           <a:p>
             <a:r>
               <a:rPr lang="hr-HR" sz="2400" dirty="0"/>
-              <a:t>Linearna memorijska složenost</a:t>
+              <a:t>Potrebno naći najdulju rastuću sekvencu relativno bliskih indeksa podudaranja</a:t>
             </a:r>
           </a:p>
           <a:p>
             <a:r>
               <a:rPr lang="hr-HR" sz="2400" dirty="0"/>
-              <a:t>Pamćenje samo zadnja dva retka NW matrice</a:t>
+              <a:t>Najvjerojatnije mapirano područje</a:t>
             </a:r>
           </a:p>
           <a:p>
             <a:r>
               <a:rPr lang="hr-HR" sz="2400" dirty="0"/>
-              <a:t>Teoretski samo 2 puta sporiji od Needleman-Wunsch algoritma</a:t>
-            </a:r>
-          </a:p>
-          <a:p>
-            <a:r>
-              <a:rPr lang="hr-HR" sz="2400" dirty="0"/>
-              <a:t>Moguće pronaći mutacije pomoću sume troška umetanja, supstitucija i brisanja te unatražnog nalaženja puta do najviše sume</a:t>
+              <a:t>Zapamtiti indekse početka i kraja mapiranog područja referentnog genoma i mutiranog očitanja</a:t>
             </a:r>
           </a:p>
         </p:txBody>
@@ -6461,7 +6876,7 @@
     </p:spTree>
     <p:extLst>
       <p:ext uri="{BB962C8B-B14F-4D97-AF65-F5344CB8AC3E}">
-        <p14:creationId xmlns:p14="http://schemas.microsoft.com/office/powerpoint/2010/main" val="4120533063"/>
+        <p14:creationId xmlns:p14="http://schemas.microsoft.com/office/powerpoint/2010/main" val="740710202"/>
       </p:ext>
     </p:extLst>
   </p:cSld>
@@ -6493,7 +6908,7 @@
           <p:cNvPr id="2" name="Title 1">
             <a:extLst>
               <a:ext uri="{FF2B5EF4-FFF2-40B4-BE49-F238E27FC236}">
-                <a16:creationId xmlns:a16="http://schemas.microsoft.com/office/drawing/2014/main" id="{1AE4E4AD-3898-4FCE-B0FE-30BD303C3928}"/>
+                <a16:creationId xmlns:a16="http://schemas.microsoft.com/office/drawing/2014/main" id="{ECE6CF85-B450-403A-9FD3-53CD6A13650E}"/>
               </a:ext>
             </a:extLst>
           </p:cNvPr>
@@ -6511,7 +6926,7 @@
           <a:p>
             <a:r>
               <a:rPr lang="hr-HR" dirty="0"/>
-              <a:t>Pronalazak mutacija i ispis</a:t>
+              <a:t>Hirschbergov algoritam</a:t>
             </a:r>
           </a:p>
         </p:txBody>
@@ -6521,7 +6936,7 @@
           <p:cNvPr id="3" name="Content Placeholder 2">
             <a:extLst>
               <a:ext uri="{FF2B5EF4-FFF2-40B4-BE49-F238E27FC236}">
-                <a16:creationId xmlns:a16="http://schemas.microsoft.com/office/drawing/2014/main" id="{D1EE0069-2C4B-43EC-9CF9-7AEEC7A21BEA}"/>
+                <a16:creationId xmlns:a16="http://schemas.microsoft.com/office/drawing/2014/main" id="{EBC233EA-1E14-4E59-9B02-96FF2FC08E8C}"/>
               </a:ext>
             </a:extLst>
           </p:cNvPr>
@@ -6541,25 +6956,31 @@
           <a:p>
             <a:r>
               <a:rPr lang="hr-HR" sz="2400" dirty="0"/>
-              <a:t>Nakon poravnanja svih očitanja imamo više mutacija na pojedinim indeksima</a:t>
+              <a:t>Dinamički algoritam za nalaženje optimalnog poravnanja</a:t>
             </a:r>
           </a:p>
           <a:p>
             <a:r>
               <a:rPr lang="hr-HR" sz="2400" dirty="0"/>
-              <a:t>Potrebno odabrati najvjerojatnije mutacije, odnosno one za koje je najviše poravnanja glasalo da su se dogodile</a:t>
+              <a:t>Linearna memorijska složenost</a:t>
             </a:r>
           </a:p>
           <a:p>
             <a:r>
               <a:rPr lang="hr-HR" sz="2400" dirty="0"/>
-              <a:t>Zbog šuma odabiremo samo one mutacije koje se na pojedinom indeksu pojavljuju u više od 50% slučajeva</a:t>
+              <a:t>Pamćenje samo zadnja dva retka NW matrice</a:t>
             </a:r>
           </a:p>
           <a:p>
             <a:r>
               <a:rPr lang="hr-HR" sz="2400" dirty="0"/>
-              <a:t>Ispis u datoteku u CSV formatu</a:t>
+              <a:t>Teoretski samo 2 puta sporiji od Needleman-Wunsch algoritma</a:t>
+            </a:r>
+          </a:p>
+          <a:p>
+            <a:r>
+              <a:rPr lang="hr-HR" sz="2400" dirty="0"/>
+              <a:t>Moguće pronaći mutacije pomoću sume troška umetanja, supstitucija i brisanja te unatražnog nalaženja puta do najviše sume</a:t>
             </a:r>
           </a:p>
         </p:txBody>
@@ -6567,7 +6988,7 @@
     </p:spTree>
     <p:extLst>
       <p:ext uri="{BB962C8B-B14F-4D97-AF65-F5344CB8AC3E}">
-        <p14:creationId xmlns:p14="http://schemas.microsoft.com/office/powerpoint/2010/main" val="935623248"/>
+        <p14:creationId xmlns:p14="http://schemas.microsoft.com/office/powerpoint/2010/main" val="4120533063"/>
       </p:ext>
     </p:extLst>
   </p:cSld>
@@ -6596,10 +7017,10 @@
       </p:grpSpPr>
       <p:sp>
         <p:nvSpPr>
-          <p:cNvPr id="2" name="Title 1">
+          <p:cNvPr id="4" name="Title 3">
             <a:extLst>
               <a:ext uri="{FF2B5EF4-FFF2-40B4-BE49-F238E27FC236}">
-                <a16:creationId xmlns:a16="http://schemas.microsoft.com/office/drawing/2014/main" id="{EFCF06C0-1A9A-491D-B8C0-BA2C2F58781E}"/>
+                <a16:creationId xmlns:a16="http://schemas.microsoft.com/office/drawing/2014/main" id="{1A424A2E-EEF5-40C4-AFD7-F3FFFEEDBD3C}"/>
               </a:ext>
             </a:extLst>
           </p:cNvPr>
@@ -6610,85 +7031,102 @@
             <p:ph type="title"/>
           </p:nvPr>
         </p:nvSpPr>
-        <p:spPr/>
+        <p:spPr>
+          <a:xfrm>
+            <a:off x="677334" y="4800600"/>
+            <a:ext cx="8596667" cy="566738"/>
+          </a:xfrm>
+        </p:spPr>
         <p:txBody>
           <a:bodyPr/>
           <a:lstStyle/>
           <a:p>
             <a:r>
-              <a:rPr lang="hr-HR" b="1" dirty="0"/>
-              <a:t>Rezultati</a:t>
-            </a:r>
-          </a:p>
-        </p:txBody>
-      </p:sp>
-      <p:sp>
-        <p:nvSpPr>
-          <p:cNvPr id="3" name="Content Placeholder 2">
+              <a:rPr lang="hr-HR" dirty="0"/>
+              <a:t>Hirschbergov algoritam</a:t>
+            </a:r>
+          </a:p>
+        </p:txBody>
+      </p:sp>
+      <p:pic>
+        <p:nvPicPr>
+          <p:cNvPr id="18" name="Picture Placeholder 17">
             <a:extLst>
               <a:ext uri="{FF2B5EF4-FFF2-40B4-BE49-F238E27FC236}">
-                <a16:creationId xmlns:a16="http://schemas.microsoft.com/office/drawing/2014/main" id="{67D9A839-D24D-4297-ABB3-9D4BE693B744}"/>
+                <a16:creationId xmlns:a16="http://schemas.microsoft.com/office/drawing/2014/main" id="{51C34897-2066-4E42-8FEE-2D0A922094CE}"/>
               </a:ext>
             </a:extLst>
           </p:cNvPr>
-          <p:cNvSpPr>
-            <a:spLocks noGrp="1"/>
-          </p:cNvSpPr>
-          <p:nvPr>
-            <p:ph idx="1"/>
-          </p:nvPr>
-        </p:nvSpPr>
-        <p:spPr/>
-        <p:txBody>
-          <a:bodyPr>
-            <a:normAutofit fontScale="92500"/>
-          </a:bodyPr>
-          <a:lstStyle/>
-          <a:p>
-            <a:r>
-              <a:rPr lang="hr-HR" sz="2400" dirty="0"/>
-              <a:t>Usporedba dobivenih mutacija s referentnom implementacijom</a:t>
-            </a:r>
-          </a:p>
-          <a:p>
-            <a:r>
-              <a:rPr lang="hr-HR" sz="2400" dirty="0"/>
-              <a:t>Jaccardov indeks</a:t>
-            </a:r>
-          </a:p>
-          <a:p>
-            <a:r>
-              <a:rPr lang="hr-HR" sz="2400" dirty="0"/>
-              <a:t>Na genomu lambde 0.72972972973, na e.coli 0.84767500855 </a:t>
-            </a:r>
-          </a:p>
-          <a:p>
-            <a:r>
-              <a:rPr lang="hr-HR" sz="2400" dirty="0"/>
-              <a:t>Vrijeme izvođenja na lambdi ~3 minute, dok na e.coli ~5 sati, paralelizirano na 8 dretvi</a:t>
-            </a:r>
-          </a:p>
-          <a:p>
-            <a:r>
-              <a:rPr lang="hr-HR" sz="2400" dirty="0"/>
-              <a:t>Zauzeće memorije ~13MB na genomu lambde te ~800MB na genomu e.coli</a:t>
-            </a:r>
-          </a:p>
-          <a:p>
-            <a:pPr marL="0" indent="0">
-              <a:buNone/>
-            </a:pPr>
-            <a:br>
+          <p:cNvPicPr>
+            <a:picLocks noGrp="1" noChangeAspect="1"/>
+          </p:cNvPicPr>
+          <p:nvPr>
+            <p:ph type="pic" idx="1"/>
+          </p:nvPr>
+        </p:nvPicPr>
+        <p:blipFill rotWithShape="1">
+          <a:blip r:embed="rId2">
+            <a:extLst>
+              <a:ext uri="{28A0092B-C50C-407E-A947-70E740481C1C}">
+                <a14:useLocalDpi xmlns:a14="http://schemas.microsoft.com/office/drawing/2010/main" val="0"/>
+              </a:ext>
+            </a:extLst>
+          </a:blip>
+          <a:srcRect l="-24882" t="-493" r="-33921" b="-38323"/>
+          <a:stretch/>
+        </p:blipFill>
+        <p:spPr>
+          <a:xfrm>
+            <a:off x="1126504" y="144642"/>
+            <a:ext cx="7698326" cy="6086476"/>
+          </a:xfrm>
+        </p:spPr>
+      </p:pic>
+      <p:sp>
+        <p:nvSpPr>
+          <p:cNvPr id="6" name="Text Placeholder 5">
+            <a:extLst>
+              <a:ext uri="{FF2B5EF4-FFF2-40B4-BE49-F238E27FC236}">
+                <a16:creationId xmlns:a16="http://schemas.microsoft.com/office/drawing/2014/main" id="{C5E602C6-37D2-4F37-A4A0-CF2E71606548}"/>
+              </a:ext>
+            </a:extLst>
+          </p:cNvPr>
+          <p:cNvSpPr>
+            <a:spLocks noGrp="1"/>
+          </p:cNvSpPr>
+          <p:nvPr>
+            <p:ph type="body" sz="half" idx="2"/>
+          </p:nvPr>
+        </p:nvSpPr>
+        <p:spPr>
+          <a:xfrm>
+            <a:off x="677334" y="5367338"/>
+            <a:ext cx="8596667" cy="674024"/>
+          </a:xfrm>
+        </p:spPr>
+        <p:txBody>
+          <a:bodyPr/>
+          <a:lstStyle/>
+          <a:p>
+            <a:r>
               <a:rPr lang="hr-HR" dirty="0"/>
-            </a:br>
-            <a:endParaRPr lang="hr-HR" dirty="0"/>
+              <a:t>Slika prikazuje ilustraciju Hirschbergovog algoritma. Algoritam u prvom koraku traži na polovici matrice indeks k* niza </a:t>
+            </a:r>
+            <a:r>
+              <a:rPr lang="hr-HR" i="1" dirty="0"/>
+              <a:t>t</a:t>
+            </a:r>
+            <a:r>
+              <a:rPr lang="hr-HR" dirty="0"/>
+              <a:t> za kojeg je zbroj poravnanja obje polovice matrice maksimalan. Nakon toga se postupak rekurzivno ponavlja u dobivenim podmatricama. Slika je preuzeta iz izvora [3].</a:t>
+            </a:r>
           </a:p>
         </p:txBody>
       </p:sp>
     </p:spTree>
     <p:extLst>
       <p:ext uri="{BB962C8B-B14F-4D97-AF65-F5344CB8AC3E}">
-        <p14:creationId xmlns:p14="http://schemas.microsoft.com/office/powerpoint/2010/main" val="3640518966"/>
+        <p14:creationId xmlns:p14="http://schemas.microsoft.com/office/powerpoint/2010/main" val="1123449225"/>
       </p:ext>
     </p:extLst>
   </p:cSld>
@@ -6720,7 +7158,7 @@
           <p:cNvPr id="2" name="Title 1">
             <a:extLst>
               <a:ext uri="{FF2B5EF4-FFF2-40B4-BE49-F238E27FC236}">
-                <a16:creationId xmlns:a16="http://schemas.microsoft.com/office/drawing/2014/main" id="{F4F3404E-375B-4E4F-B224-D425DAEBBF57}"/>
+                <a16:creationId xmlns:a16="http://schemas.microsoft.com/office/drawing/2014/main" id="{1AE4E4AD-3898-4FCE-B0FE-30BD303C3928}"/>
               </a:ext>
             </a:extLst>
           </p:cNvPr>
@@ -6737,8 +7175,8 @@
           <a:lstStyle/>
           <a:p>
             <a:r>
-              <a:rPr lang="hr-HR" b="1" dirty="0"/>
-              <a:t>Zaključak</a:t>
+              <a:rPr lang="hr-HR" dirty="0"/>
+              <a:t>Pronalazak mutacija i ispis</a:t>
             </a:r>
           </a:p>
         </p:txBody>
@@ -6748,7 +7186,7 @@
           <p:cNvPr id="3" name="Content Placeholder 2">
             <a:extLst>
               <a:ext uri="{FF2B5EF4-FFF2-40B4-BE49-F238E27FC236}">
-                <a16:creationId xmlns:a16="http://schemas.microsoft.com/office/drawing/2014/main" id="{F9D5FFFA-261D-40C8-ABB3-980AFE8FFDD1}"/>
+                <a16:creationId xmlns:a16="http://schemas.microsoft.com/office/drawing/2014/main" id="{D1EE0069-2C4B-43EC-9CF9-7AEEC7A21BEA}"/>
               </a:ext>
             </a:extLst>
           </p:cNvPr>
@@ -6768,19 +7206,25 @@
           <a:p>
             <a:r>
               <a:rPr lang="hr-HR" sz="2400" dirty="0"/>
-              <a:t>Korišteni algoritmi daju dobre rezultate i kod sekvenciranja s vrlo visokom pogreškom</a:t>
+              <a:t>Nakon poravnanja svih očitanja imamo više mutacija na pojedinim indeksima</a:t>
             </a:r>
           </a:p>
           <a:p>
             <a:r>
               <a:rPr lang="hr-HR" sz="2400" dirty="0"/>
-              <a:t>Vrlo visoka točnost te vrlo niska memorijska složenost</a:t>
+              <a:t>Potrebno odabrati najvjerojatnije mutacije, odnosno one za koje je najviše poravnanja glasalo da su se dogodile</a:t>
             </a:r>
           </a:p>
           <a:p>
             <a:r>
               <a:rPr lang="hr-HR" sz="2400" dirty="0"/>
-              <a:t>Problem je vremenska složenost</a:t>
+              <a:t>Zbog šuma odabiremo samo one mutacije koje se na pojedinom indeksu pojavljuju u više od 50% slučajeva</a:t>
+            </a:r>
+          </a:p>
+          <a:p>
+            <a:r>
+              <a:rPr lang="hr-HR" sz="2400" dirty="0"/>
+              <a:t>Ispis u datoteku u CSV formatu</a:t>
             </a:r>
           </a:p>
         </p:txBody>
@@ -6788,7 +7232,7 @@
     </p:spTree>
     <p:extLst>
       <p:ext uri="{BB962C8B-B14F-4D97-AF65-F5344CB8AC3E}">
-        <p14:creationId xmlns:p14="http://schemas.microsoft.com/office/powerpoint/2010/main" val="1923492173"/>
+        <p14:creationId xmlns:p14="http://schemas.microsoft.com/office/powerpoint/2010/main" val="935623248"/>
       </p:ext>
     </p:extLst>
   </p:cSld>

</xml_diff>